<commit_message>
petites modifs sur la doc
</commit_message>
<xml_diff>
--- a/doc/Diapo.pptx
+++ b/doc/Diapo.pptx
@@ -130,6 +130,22 @@
       </a:defRPr>
     </a:lvl9pPr>
   </p:defaultTextStyle>
+  <p:extLst>
+    <p:ext uri="{EFAFB233-063F-42B5-8137-9DF3F51BA10A}">
+      <p15:sldGuideLst xmlns:p15="http://schemas.microsoft.com/office/powerpoint/2012/main">
+        <p15:guide id="1" orient="horz" pos="2160">
+          <p15:clr>
+            <a:srgbClr val="A4A3A4"/>
+          </p15:clr>
+        </p15:guide>
+        <p15:guide id="2" pos="2880">
+          <p15:clr>
+            <a:srgbClr val="A4A3A4"/>
+          </p15:clr>
+        </p15:guide>
+      </p15:sldGuideLst>
+    </p:ext>
+  </p:extLst>
 </p:presentation>
 </file>
 
@@ -385,6 +401,11 @@
         </p:txBody>
       </p:sp>
     </p:spTree>
+    <p:extLst>
+      <p:ext uri="{BB962C8B-B14F-4D97-AF65-F5344CB8AC3E}">
+        <p14:creationId xmlns:p14="http://schemas.microsoft.com/office/powerpoint/2010/main" val="45641624"/>
+      </p:ext>
+    </p:extLst>
   </p:cSld>
   <p:clrMap bg1="lt1" tx1="dk1" bg2="lt2" tx2="dk2" accent1="accent1" accent2="accent2" accent3="accent3" accent4="accent4" accent5="accent5" accent6="accent6" hlink="hlink" folHlink="folHlink"/>
   <p:notesStyle>
@@ -586,6 +607,11 @@
         </p:txBody>
       </p:sp>
     </p:spTree>
+    <p:extLst>
+      <p:ext uri="{BB962C8B-B14F-4D97-AF65-F5344CB8AC3E}">
+        <p14:creationId xmlns:p14="http://schemas.microsoft.com/office/powerpoint/2010/main" val="2228747940"/>
+      </p:ext>
+    </p:extLst>
   </p:cSld>
   <p:clrMapOvr>
     <a:masterClrMapping/>
@@ -668,6 +694,11 @@
         </p:txBody>
       </p:sp>
     </p:spTree>
+    <p:extLst>
+      <p:ext uri="{BB962C8B-B14F-4D97-AF65-F5344CB8AC3E}">
+        <p14:creationId xmlns:p14="http://schemas.microsoft.com/office/powerpoint/2010/main" val="1398145928"/>
+      </p:ext>
+    </p:extLst>
   </p:cSld>
   <p:clrMapOvr>
     <a:masterClrMapping/>
@@ -750,6 +781,11 @@
         </p:txBody>
       </p:sp>
     </p:spTree>
+    <p:extLst>
+      <p:ext uri="{BB962C8B-B14F-4D97-AF65-F5344CB8AC3E}">
+        <p14:creationId xmlns:p14="http://schemas.microsoft.com/office/powerpoint/2010/main" val="2215035958"/>
+      </p:ext>
+    </p:extLst>
   </p:cSld>
   <p:clrMapOvr>
     <a:masterClrMapping/>
@@ -832,6 +868,11 @@
         </p:txBody>
       </p:sp>
     </p:spTree>
+    <p:extLst>
+      <p:ext uri="{BB962C8B-B14F-4D97-AF65-F5344CB8AC3E}">
+        <p14:creationId xmlns:p14="http://schemas.microsoft.com/office/powerpoint/2010/main" val="4078183470"/>
+      </p:ext>
+    </p:extLst>
   </p:cSld>
   <p:clrMapOvr>
     <a:masterClrMapping/>
@@ -914,6 +955,11 @@
         </p:txBody>
       </p:sp>
     </p:spTree>
+    <p:extLst>
+      <p:ext uri="{BB962C8B-B14F-4D97-AF65-F5344CB8AC3E}">
+        <p14:creationId xmlns:p14="http://schemas.microsoft.com/office/powerpoint/2010/main" val="511339895"/>
+      </p:ext>
+    </p:extLst>
   </p:cSld>
   <p:clrMapOvr>
     <a:masterClrMapping/>
@@ -996,6 +1042,11 @@
         </p:txBody>
       </p:sp>
     </p:spTree>
+    <p:extLst>
+      <p:ext uri="{BB962C8B-B14F-4D97-AF65-F5344CB8AC3E}">
+        <p14:creationId xmlns:p14="http://schemas.microsoft.com/office/powerpoint/2010/main" val="1329930481"/>
+      </p:ext>
+    </p:extLst>
   </p:cSld>
   <p:clrMapOvr>
     <a:masterClrMapping/>
@@ -1078,6 +1129,11 @@
         </p:txBody>
       </p:sp>
     </p:spTree>
+    <p:extLst>
+      <p:ext uri="{BB962C8B-B14F-4D97-AF65-F5344CB8AC3E}">
+        <p14:creationId xmlns:p14="http://schemas.microsoft.com/office/powerpoint/2010/main" val="1420921446"/>
+      </p:ext>
+    </p:extLst>
   </p:cSld>
   <p:clrMapOvr>
     <a:masterClrMapping/>
@@ -1160,6 +1216,11 @@
         </p:txBody>
       </p:sp>
     </p:spTree>
+    <p:extLst>
+      <p:ext uri="{BB962C8B-B14F-4D97-AF65-F5344CB8AC3E}">
+        <p14:creationId xmlns:p14="http://schemas.microsoft.com/office/powerpoint/2010/main" val="2537194441"/>
+      </p:ext>
+    </p:extLst>
   </p:cSld>
   <p:clrMapOvr>
     <a:masterClrMapping/>
@@ -1242,6 +1303,11 @@
         </p:txBody>
       </p:sp>
     </p:spTree>
+    <p:extLst>
+      <p:ext uri="{BB962C8B-B14F-4D97-AF65-F5344CB8AC3E}">
+        <p14:creationId xmlns:p14="http://schemas.microsoft.com/office/powerpoint/2010/main" val="4069220086"/>
+      </p:ext>
+    </p:extLst>
   </p:cSld>
   <p:clrMapOvr>
     <a:masterClrMapping/>
@@ -1324,6 +1390,11 @@
         </p:txBody>
       </p:sp>
     </p:spTree>
+    <p:extLst>
+      <p:ext uri="{BB962C8B-B14F-4D97-AF65-F5344CB8AC3E}">
+        <p14:creationId xmlns:p14="http://schemas.microsoft.com/office/powerpoint/2010/main" val="2188083174"/>
+      </p:ext>
+    </p:extLst>
   </p:cSld>
   <p:clrMapOvr>
     <a:masterClrMapping/>
@@ -1406,6 +1477,11 @@
         </p:txBody>
       </p:sp>
     </p:spTree>
+    <p:extLst>
+      <p:ext uri="{BB962C8B-B14F-4D97-AF65-F5344CB8AC3E}">
+        <p14:creationId xmlns:p14="http://schemas.microsoft.com/office/powerpoint/2010/main" val="1537290242"/>
+      </p:ext>
+    </p:extLst>
   </p:cSld>
   <p:clrMapOvr>
     <a:masterClrMapping/>
@@ -1500,6 +1576,11 @@
         </p:txBody>
       </p:sp>
     </p:spTree>
+    <p:extLst>
+      <p:ext uri="{BB962C8B-B14F-4D97-AF65-F5344CB8AC3E}">
+        <p14:creationId xmlns:p14="http://schemas.microsoft.com/office/powerpoint/2010/main" val="1628508158"/>
+      </p:ext>
+    </p:extLst>
   </p:cSld>
   <p:clrMapOvr>
     <a:masterClrMapping/>
@@ -1582,6 +1663,11 @@
         </p:txBody>
       </p:sp>
     </p:spTree>
+    <p:extLst>
+      <p:ext uri="{BB962C8B-B14F-4D97-AF65-F5344CB8AC3E}">
+        <p14:creationId xmlns:p14="http://schemas.microsoft.com/office/powerpoint/2010/main" val="725683917"/>
+      </p:ext>
+    </p:extLst>
   </p:cSld>
   <p:clrMapOvr>
     <a:masterClrMapping/>
@@ -1664,6 +1750,11 @@
         </p:txBody>
       </p:sp>
     </p:spTree>
+    <p:extLst>
+      <p:ext uri="{BB962C8B-B14F-4D97-AF65-F5344CB8AC3E}">
+        <p14:creationId xmlns:p14="http://schemas.microsoft.com/office/powerpoint/2010/main" val="3526639435"/>
+      </p:ext>
+    </p:extLst>
   </p:cSld>
   <p:clrMapOvr>
     <a:masterClrMapping/>
@@ -1746,6 +1837,11 @@
         </p:txBody>
       </p:sp>
     </p:spTree>
+    <p:extLst>
+      <p:ext uri="{BB962C8B-B14F-4D97-AF65-F5344CB8AC3E}">
+        <p14:creationId xmlns:p14="http://schemas.microsoft.com/office/powerpoint/2010/main" val="1321478154"/>
+      </p:ext>
+    </p:extLst>
   </p:cSld>
   <p:clrMapOvr>
     <a:masterClrMapping/>
@@ -1828,6 +1924,11 @@
         </p:txBody>
       </p:sp>
     </p:spTree>
+    <p:extLst>
+      <p:ext uri="{BB962C8B-B14F-4D97-AF65-F5344CB8AC3E}">
+        <p14:creationId xmlns:p14="http://schemas.microsoft.com/office/powerpoint/2010/main" val="2004548286"/>
+      </p:ext>
+    </p:extLst>
   </p:cSld>
   <p:clrMapOvr>
     <a:masterClrMapping/>
@@ -1910,6 +2011,11 @@
         </p:txBody>
       </p:sp>
     </p:spTree>
+    <p:extLst>
+      <p:ext uri="{BB962C8B-B14F-4D97-AF65-F5344CB8AC3E}">
+        <p14:creationId xmlns:p14="http://schemas.microsoft.com/office/powerpoint/2010/main" val="3448461766"/>
+      </p:ext>
+    </p:extLst>
   </p:cSld>
   <p:clrMapOvr>
     <a:masterClrMapping/>
@@ -1992,6 +2098,11 @@
         </p:txBody>
       </p:sp>
     </p:spTree>
+    <p:extLst>
+      <p:ext uri="{BB962C8B-B14F-4D97-AF65-F5344CB8AC3E}">
+        <p14:creationId xmlns:p14="http://schemas.microsoft.com/office/powerpoint/2010/main" val="212553317"/>
+      </p:ext>
+    </p:extLst>
   </p:cSld>
   <p:clrMapOvr>
     <a:masterClrMapping/>
@@ -2135,6 +2246,11 @@
         </p:txBody>
       </p:sp>
     </p:spTree>
+    <p:extLst>
+      <p:ext uri="{BB962C8B-B14F-4D97-AF65-F5344CB8AC3E}">
+        <p14:creationId xmlns:p14="http://schemas.microsoft.com/office/powerpoint/2010/main" val="1461847046"/>
+      </p:ext>
+    </p:extLst>
   </p:cSld>
   <p:clrMapOvr>
     <a:masterClrMapping/>
@@ -2278,6 +2394,11 @@
         </p:txBody>
       </p:sp>
     </p:spTree>
+    <p:extLst>
+      <p:ext uri="{BB962C8B-B14F-4D97-AF65-F5344CB8AC3E}">
+        <p14:creationId xmlns:p14="http://schemas.microsoft.com/office/powerpoint/2010/main" val="1520764927"/>
+      </p:ext>
+    </p:extLst>
   </p:cSld>
   <p:clrMapOvr>
     <a:masterClrMapping/>
@@ -6824,6 +6945,36 @@
           </a:p>
         </p:txBody>
       </p:sp>
+      <p:pic>
+        <p:nvPicPr>
+          <p:cNvPr id="5" name="Image 4"/>
+          <p:cNvPicPr>
+            <a:picLocks noChangeAspect="1"/>
+          </p:cNvPicPr>
+          <p:nvPr/>
+        </p:nvPicPr>
+        <p:blipFill>
+          <a:blip r:embed="rId2">
+            <a:extLst>
+              <a:ext uri="{28A0092B-C50C-407E-A947-70E740481C1C}">
+                <a14:useLocalDpi xmlns:a14="http://schemas.microsoft.com/office/drawing/2010/main" val="0"/>
+              </a:ext>
+            </a:extLst>
+          </a:blip>
+          <a:stretch>
+            <a:fillRect/>
+          </a:stretch>
+        </p:blipFill>
+        <p:spPr>
+          <a:xfrm>
+            <a:off x="321786" y="5661248"/>
+            <a:ext cx="1480234" cy="954990"/>
+          </a:xfrm>
+          <a:prstGeom prst="rect">
+            <a:avLst/>
+          </a:prstGeom>
+        </p:spPr>
+      </p:pic>
     </p:spTree>
   </p:cSld>
   <p:clrMapOvr>
@@ -6953,6 +7104,36 @@
             <a:headEnd/>
             <a:tailEnd/>
           </a:ln>
+        </p:spPr>
+      </p:pic>
+      <p:pic>
+        <p:nvPicPr>
+          <p:cNvPr id="5" name="Image 4"/>
+          <p:cNvPicPr>
+            <a:picLocks noChangeAspect="1"/>
+          </p:cNvPicPr>
+          <p:nvPr/>
+        </p:nvPicPr>
+        <p:blipFill>
+          <a:blip r:embed="rId4" cstate="print">
+            <a:extLst>
+              <a:ext uri="{28A0092B-C50C-407E-A947-70E740481C1C}">
+                <a14:useLocalDpi xmlns:a14="http://schemas.microsoft.com/office/drawing/2010/main" val="0"/>
+              </a:ext>
+            </a:extLst>
+          </a:blip>
+          <a:stretch>
+            <a:fillRect/>
+          </a:stretch>
+        </p:blipFill>
+        <p:spPr>
+          <a:xfrm>
+            <a:off x="7956376" y="6070981"/>
+            <a:ext cx="943868" cy="608947"/>
+          </a:xfrm>
+          <a:prstGeom prst="rect">
+            <a:avLst/>
+          </a:prstGeom>
         </p:spPr>
       </p:pic>
     </p:spTree>
@@ -6980,6 +7161,36 @@
           <a:chExt cx="0" cy="0"/>
         </a:xfrm>
       </p:grpSpPr>
+      <p:pic>
+        <p:nvPicPr>
+          <p:cNvPr id="5" name="Image 4"/>
+          <p:cNvPicPr>
+            <a:picLocks noChangeAspect="1"/>
+          </p:cNvPicPr>
+          <p:nvPr/>
+        </p:nvPicPr>
+        <p:blipFill>
+          <a:blip r:embed="rId3" cstate="print">
+            <a:extLst>
+              <a:ext uri="{28A0092B-C50C-407E-A947-70E740481C1C}">
+                <a14:useLocalDpi xmlns:a14="http://schemas.microsoft.com/office/drawing/2010/main" val="0"/>
+              </a:ext>
+            </a:extLst>
+          </a:blip>
+          <a:stretch>
+            <a:fillRect/>
+          </a:stretch>
+        </p:blipFill>
+        <p:spPr>
+          <a:xfrm>
+            <a:off x="7956376" y="6070981"/>
+            <a:ext cx="943868" cy="608947"/>
+          </a:xfrm>
+          <a:prstGeom prst="rect">
+            <a:avLst/>
+          </a:prstGeom>
+        </p:spPr>
+      </p:pic>
       <p:sp>
         <p:nvSpPr>
           <p:cNvPr id="3" name="Titre 2"/>
@@ -7061,7 +7272,7 @@
           <p:nvPr/>
         </p:nvPicPr>
         <p:blipFill>
-          <a:blip r:embed="rId3" cstate="print"/>
+          <a:blip r:embed="rId4" cstate="print"/>
           <a:srcRect/>
           <a:stretch>
             <a:fillRect/>
@@ -7555,6 +7766,36 @@
           </a:prstGeom>
         </p:spPr>
       </p:pic>
+      <p:pic>
+        <p:nvPicPr>
+          <p:cNvPr id="15" name="Image 14"/>
+          <p:cNvPicPr>
+            <a:picLocks noChangeAspect="1"/>
+          </p:cNvPicPr>
+          <p:nvPr/>
+        </p:nvPicPr>
+        <p:blipFill>
+          <a:blip r:embed="rId8" cstate="print">
+            <a:extLst>
+              <a:ext uri="{28A0092B-C50C-407E-A947-70E740481C1C}">
+                <a14:useLocalDpi xmlns:a14="http://schemas.microsoft.com/office/drawing/2010/main" val="0"/>
+              </a:ext>
+            </a:extLst>
+          </a:blip>
+          <a:stretch>
+            <a:fillRect/>
+          </a:stretch>
+        </p:blipFill>
+        <p:spPr>
+          <a:xfrm>
+            <a:off x="7956376" y="6070981"/>
+            <a:ext cx="943868" cy="608947"/>
+          </a:xfrm>
+          <a:prstGeom prst="rect">
+            <a:avLst/>
+          </a:prstGeom>
+        </p:spPr>
+      </p:pic>
     </p:spTree>
   </p:cSld>
   <p:clrMapOvr>
@@ -8094,6 +8335,36 @@
           </a:ln>
         </p:spPr>
       </p:pic>
+      <p:pic>
+        <p:nvPicPr>
+          <p:cNvPr id="20" name="Image 19"/>
+          <p:cNvPicPr>
+            <a:picLocks noChangeAspect="1"/>
+          </p:cNvPicPr>
+          <p:nvPr/>
+        </p:nvPicPr>
+        <p:blipFill>
+          <a:blip r:embed="rId13" cstate="print">
+            <a:extLst>
+              <a:ext uri="{28A0092B-C50C-407E-A947-70E740481C1C}">
+                <a14:useLocalDpi xmlns:a14="http://schemas.microsoft.com/office/drawing/2010/main" val="0"/>
+              </a:ext>
+            </a:extLst>
+          </a:blip>
+          <a:stretch>
+            <a:fillRect/>
+          </a:stretch>
+        </p:blipFill>
+        <p:spPr>
+          <a:xfrm>
+            <a:off x="7956376" y="6070981"/>
+            <a:ext cx="943868" cy="608947"/>
+          </a:xfrm>
+          <a:prstGeom prst="rect">
+            <a:avLst/>
+          </a:prstGeom>
+        </p:spPr>
+      </p:pic>
     </p:spTree>
   </p:cSld>
   <p:clrMapOvr>
@@ -8149,7 +8420,6 @@
               <a:rPr lang="fr-FR" sz="2000" b="1" dirty="0" smtClean="0"/>
               <a:t>Connexion à l’application</a:t>
             </a:r>
-            <a:endParaRPr lang="fr-FR" sz="2000" b="1" dirty="0" smtClean="0"/>
           </a:p>
         </p:txBody>
       </p:sp>
@@ -8247,6 +8517,36 @@
             <a:headEnd/>
             <a:tailEnd/>
           </a:ln>
+        </p:spPr>
+      </p:pic>
+      <p:pic>
+        <p:nvPicPr>
+          <p:cNvPr id="6" name="Image 5"/>
+          <p:cNvPicPr>
+            <a:picLocks noChangeAspect="1"/>
+          </p:cNvPicPr>
+          <p:nvPr/>
+        </p:nvPicPr>
+        <p:blipFill>
+          <a:blip r:embed="rId4" cstate="print">
+            <a:extLst>
+              <a:ext uri="{28A0092B-C50C-407E-A947-70E740481C1C}">
+                <a14:useLocalDpi xmlns:a14="http://schemas.microsoft.com/office/drawing/2010/main" val="0"/>
+              </a:ext>
+            </a:extLst>
+          </a:blip>
+          <a:stretch>
+            <a:fillRect/>
+          </a:stretch>
+        </p:blipFill>
+        <p:spPr>
+          <a:xfrm>
+            <a:off x="7956376" y="6070981"/>
+            <a:ext cx="943868" cy="608947"/>
+          </a:xfrm>
+          <a:prstGeom prst="rect">
+            <a:avLst/>
+          </a:prstGeom>
         </p:spPr>
       </p:pic>
     </p:spTree>
@@ -8304,7 +8604,6 @@
               <a:rPr lang="fr-FR" sz="2000" b="1" dirty="0" smtClean="0"/>
               <a:t>Menu principal</a:t>
             </a:r>
-            <a:endParaRPr lang="fr-FR" sz="2000" b="1" dirty="0" smtClean="0"/>
           </a:p>
         </p:txBody>
       </p:sp>
@@ -8402,6 +8701,36 @@
             <a:headEnd/>
             <a:tailEnd/>
           </a:ln>
+        </p:spPr>
+      </p:pic>
+      <p:pic>
+        <p:nvPicPr>
+          <p:cNvPr id="6" name="Image 5"/>
+          <p:cNvPicPr>
+            <a:picLocks noChangeAspect="1"/>
+          </p:cNvPicPr>
+          <p:nvPr/>
+        </p:nvPicPr>
+        <p:blipFill>
+          <a:blip r:embed="rId4" cstate="print">
+            <a:extLst>
+              <a:ext uri="{28A0092B-C50C-407E-A947-70E740481C1C}">
+                <a14:useLocalDpi xmlns:a14="http://schemas.microsoft.com/office/drawing/2010/main" val="0"/>
+              </a:ext>
+            </a:extLst>
+          </a:blip>
+          <a:stretch>
+            <a:fillRect/>
+          </a:stretch>
+        </p:blipFill>
+        <p:spPr>
+          <a:xfrm>
+            <a:off x="7956376" y="6070981"/>
+            <a:ext cx="943868" cy="608947"/>
+          </a:xfrm>
+          <a:prstGeom prst="rect">
+            <a:avLst/>
+          </a:prstGeom>
         </p:spPr>
       </p:pic>
     </p:spTree>
@@ -8459,7 +8788,6 @@
               <a:rPr lang="fr-FR" sz="2000" b="1" dirty="0" smtClean="0"/>
               <a:t>Enregistrement d’un certificat médical</a:t>
             </a:r>
-            <a:endParaRPr lang="fr-FR" sz="2000" b="1" dirty="0" smtClean="0"/>
           </a:p>
         </p:txBody>
       </p:sp>
@@ -8589,6 +8917,36 @@
             <a:headEnd/>
             <a:tailEnd/>
           </a:ln>
+        </p:spPr>
+      </p:pic>
+      <p:pic>
+        <p:nvPicPr>
+          <p:cNvPr id="7" name="Image 6"/>
+          <p:cNvPicPr>
+            <a:picLocks noChangeAspect="1"/>
+          </p:cNvPicPr>
+          <p:nvPr/>
+        </p:nvPicPr>
+        <p:blipFill>
+          <a:blip r:embed="rId5" cstate="print">
+            <a:extLst>
+              <a:ext uri="{28A0092B-C50C-407E-A947-70E740481C1C}">
+                <a14:useLocalDpi xmlns:a14="http://schemas.microsoft.com/office/drawing/2010/main" val="0"/>
+              </a:ext>
+            </a:extLst>
+          </a:blip>
+          <a:stretch>
+            <a:fillRect/>
+          </a:stretch>
+        </p:blipFill>
+        <p:spPr>
+          <a:xfrm>
+            <a:off x="7956376" y="6070981"/>
+            <a:ext cx="943868" cy="608947"/>
+          </a:xfrm>
+          <a:prstGeom prst="rect">
+            <a:avLst/>
+          </a:prstGeom>
         </p:spPr>
       </p:pic>
     </p:spTree>
@@ -8646,7 +9004,6 @@
               <a:rPr lang="fr-FR" sz="2000" b="1" dirty="0" smtClean="0"/>
               <a:t>Gestion du profil médecin</a:t>
             </a:r>
-            <a:endParaRPr lang="fr-FR" sz="2000" b="1" dirty="0" smtClean="0"/>
           </a:p>
         </p:txBody>
       </p:sp>
@@ -8776,6 +9133,36 @@
             <a:headEnd/>
             <a:tailEnd/>
           </a:ln>
+        </p:spPr>
+      </p:pic>
+      <p:pic>
+        <p:nvPicPr>
+          <p:cNvPr id="7" name="Image 6"/>
+          <p:cNvPicPr>
+            <a:picLocks noChangeAspect="1"/>
+          </p:cNvPicPr>
+          <p:nvPr/>
+        </p:nvPicPr>
+        <p:blipFill>
+          <a:blip r:embed="rId5" cstate="print">
+            <a:extLst>
+              <a:ext uri="{28A0092B-C50C-407E-A947-70E740481C1C}">
+                <a14:useLocalDpi xmlns:a14="http://schemas.microsoft.com/office/drawing/2010/main" val="0"/>
+              </a:ext>
+            </a:extLst>
+          </a:blip>
+          <a:stretch>
+            <a:fillRect/>
+          </a:stretch>
+        </p:blipFill>
+        <p:spPr>
+          <a:xfrm>
+            <a:off x="7956376" y="6070981"/>
+            <a:ext cx="943868" cy="608947"/>
+          </a:xfrm>
+          <a:prstGeom prst="rect">
+            <a:avLst/>
+          </a:prstGeom>
         </p:spPr>
       </p:pic>
     </p:spTree>
@@ -8833,7 +9220,6 @@
               <a:rPr lang="fr-FR" sz="2000" b="1" dirty="0" smtClean="0"/>
               <a:t>Historique des certificats médical</a:t>
             </a:r>
-            <a:endParaRPr lang="fr-FR" sz="2000" b="1" dirty="0" smtClean="0"/>
           </a:p>
         </p:txBody>
       </p:sp>
@@ -8963,6 +9349,36 @@
             <a:headEnd/>
             <a:tailEnd/>
           </a:ln>
+        </p:spPr>
+      </p:pic>
+      <p:pic>
+        <p:nvPicPr>
+          <p:cNvPr id="7" name="Image 6"/>
+          <p:cNvPicPr>
+            <a:picLocks noChangeAspect="1"/>
+          </p:cNvPicPr>
+          <p:nvPr/>
+        </p:nvPicPr>
+        <p:blipFill>
+          <a:blip r:embed="rId5" cstate="print">
+            <a:extLst>
+              <a:ext uri="{28A0092B-C50C-407E-A947-70E740481C1C}">
+                <a14:useLocalDpi xmlns:a14="http://schemas.microsoft.com/office/drawing/2010/main" val="0"/>
+              </a:ext>
+            </a:extLst>
+          </a:blip>
+          <a:stretch>
+            <a:fillRect/>
+          </a:stretch>
+        </p:blipFill>
+        <p:spPr>
+          <a:xfrm>
+            <a:off x="7956376" y="6070981"/>
+            <a:ext cx="943868" cy="608947"/>
+          </a:xfrm>
+          <a:prstGeom prst="rect">
+            <a:avLst/>
+          </a:prstGeom>
         </p:spPr>
       </p:pic>
     </p:spTree>
@@ -9020,7 +9436,6 @@
               <a:rPr lang="fr-FR" sz="2000" b="1" dirty="0" smtClean="0"/>
               <a:t>Gestion des étudiants</a:t>
             </a:r>
-            <a:endParaRPr lang="fr-FR" sz="2000" b="1" dirty="0" smtClean="0"/>
           </a:p>
         </p:txBody>
       </p:sp>
@@ -9150,6 +9565,36 @@
             <a:headEnd/>
             <a:tailEnd/>
           </a:ln>
+        </p:spPr>
+      </p:pic>
+      <p:pic>
+        <p:nvPicPr>
+          <p:cNvPr id="7" name="Image 6"/>
+          <p:cNvPicPr>
+            <a:picLocks noChangeAspect="1"/>
+          </p:cNvPicPr>
+          <p:nvPr/>
+        </p:nvPicPr>
+        <p:blipFill>
+          <a:blip r:embed="rId5" cstate="print">
+            <a:extLst>
+              <a:ext uri="{28A0092B-C50C-407E-A947-70E740481C1C}">
+                <a14:useLocalDpi xmlns:a14="http://schemas.microsoft.com/office/drawing/2010/main" val="0"/>
+              </a:ext>
+            </a:extLst>
+          </a:blip>
+          <a:stretch>
+            <a:fillRect/>
+          </a:stretch>
+        </p:blipFill>
+        <p:spPr>
+          <a:xfrm>
+            <a:off x="7956376" y="6070981"/>
+            <a:ext cx="943868" cy="608947"/>
+          </a:xfrm>
+          <a:prstGeom prst="rect">
+            <a:avLst/>
+          </a:prstGeom>
         </p:spPr>
       </p:pic>
     </p:spTree>
@@ -9253,6 +9698,36 @@
           </a:p>
         </p:txBody>
       </p:sp>
+      <p:pic>
+        <p:nvPicPr>
+          <p:cNvPr id="4" name="Image 3"/>
+          <p:cNvPicPr>
+            <a:picLocks noChangeAspect="1"/>
+          </p:cNvPicPr>
+          <p:nvPr/>
+        </p:nvPicPr>
+        <p:blipFill>
+          <a:blip r:embed="rId3" cstate="print">
+            <a:extLst>
+              <a:ext uri="{28A0092B-C50C-407E-A947-70E740481C1C}">
+                <a14:useLocalDpi xmlns:a14="http://schemas.microsoft.com/office/drawing/2010/main" val="0"/>
+              </a:ext>
+            </a:extLst>
+          </a:blip>
+          <a:stretch>
+            <a:fillRect/>
+          </a:stretch>
+        </p:blipFill>
+        <p:spPr>
+          <a:xfrm>
+            <a:off x="7956376" y="6070981"/>
+            <a:ext cx="943868" cy="608947"/>
+          </a:xfrm>
+          <a:prstGeom prst="rect">
+            <a:avLst/>
+          </a:prstGeom>
+        </p:spPr>
+      </p:pic>
     </p:spTree>
   </p:cSld>
   <p:clrMapOvr>
@@ -9308,7 +9783,6 @@
               <a:rPr lang="fr-FR" sz="2000" b="1" dirty="0" smtClean="0"/>
               <a:t>Enregistrement d’un nouvel étudiant</a:t>
             </a:r>
-            <a:endParaRPr lang="fr-FR" sz="2000" b="1" dirty="0" smtClean="0"/>
           </a:p>
         </p:txBody>
       </p:sp>
@@ -9438,6 +9912,36 @@
             <a:headEnd/>
             <a:tailEnd/>
           </a:ln>
+        </p:spPr>
+      </p:pic>
+      <p:pic>
+        <p:nvPicPr>
+          <p:cNvPr id="7" name="Image 6"/>
+          <p:cNvPicPr>
+            <a:picLocks noChangeAspect="1"/>
+          </p:cNvPicPr>
+          <p:nvPr/>
+        </p:nvPicPr>
+        <p:blipFill>
+          <a:blip r:embed="rId5" cstate="print">
+            <a:extLst>
+              <a:ext uri="{28A0092B-C50C-407E-A947-70E740481C1C}">
+                <a14:useLocalDpi xmlns:a14="http://schemas.microsoft.com/office/drawing/2010/main" val="0"/>
+              </a:ext>
+            </a:extLst>
+          </a:blip>
+          <a:stretch>
+            <a:fillRect/>
+          </a:stretch>
+        </p:blipFill>
+        <p:spPr>
+          <a:xfrm>
+            <a:off x="7956376" y="6070981"/>
+            <a:ext cx="943868" cy="608947"/>
+          </a:xfrm>
+          <a:prstGeom prst="rect">
+            <a:avLst/>
+          </a:prstGeom>
         </p:spPr>
       </p:pic>
     </p:spTree>
@@ -9495,7 +9999,6 @@
               <a:rPr lang="fr-FR" sz="2000" b="1" dirty="0" smtClean="0"/>
               <a:t>Edition/Suppression d’un étudiant</a:t>
             </a:r>
-            <a:endParaRPr lang="fr-FR" sz="2000" b="1" dirty="0" smtClean="0"/>
           </a:p>
         </p:txBody>
       </p:sp>
@@ -9625,6 +10128,36 @@
             <a:headEnd/>
             <a:tailEnd/>
           </a:ln>
+        </p:spPr>
+      </p:pic>
+      <p:pic>
+        <p:nvPicPr>
+          <p:cNvPr id="7" name="Image 6"/>
+          <p:cNvPicPr>
+            <a:picLocks noChangeAspect="1"/>
+          </p:cNvPicPr>
+          <p:nvPr/>
+        </p:nvPicPr>
+        <p:blipFill>
+          <a:blip r:embed="rId5" cstate="print">
+            <a:extLst>
+              <a:ext uri="{28A0092B-C50C-407E-A947-70E740481C1C}">
+                <a14:useLocalDpi xmlns:a14="http://schemas.microsoft.com/office/drawing/2010/main" val="0"/>
+              </a:ext>
+            </a:extLst>
+          </a:blip>
+          <a:stretch>
+            <a:fillRect/>
+          </a:stretch>
+        </p:blipFill>
+        <p:spPr>
+          <a:xfrm>
+            <a:off x="7956376" y="6070981"/>
+            <a:ext cx="943868" cy="608947"/>
+          </a:xfrm>
+          <a:prstGeom prst="rect">
+            <a:avLst/>
+          </a:prstGeom>
         </p:spPr>
       </p:pic>
     </p:spTree>
@@ -9681,7 +10214,6 @@
               <a:rPr lang="fr-FR" sz="8000" b="1" dirty="0" smtClean="0"/>
               <a:t>Démonstration</a:t>
             </a:r>
-            <a:endParaRPr lang="fr-FR" sz="8000" b="1" dirty="0" smtClean="0"/>
           </a:p>
         </p:txBody>
       </p:sp>
@@ -9711,6 +10243,36 @@
           </a:p>
         </p:txBody>
       </p:sp>
+      <p:pic>
+        <p:nvPicPr>
+          <p:cNvPr id="4" name="Image 3"/>
+          <p:cNvPicPr>
+            <a:picLocks noChangeAspect="1"/>
+          </p:cNvPicPr>
+          <p:nvPr/>
+        </p:nvPicPr>
+        <p:blipFill>
+          <a:blip r:embed="rId3" cstate="print">
+            <a:extLst>
+              <a:ext uri="{28A0092B-C50C-407E-A947-70E740481C1C}">
+                <a14:useLocalDpi xmlns:a14="http://schemas.microsoft.com/office/drawing/2010/main" val="0"/>
+              </a:ext>
+            </a:extLst>
+          </a:blip>
+          <a:stretch>
+            <a:fillRect/>
+          </a:stretch>
+        </p:blipFill>
+        <p:spPr>
+          <a:xfrm>
+            <a:off x="7956376" y="6070981"/>
+            <a:ext cx="943868" cy="608947"/>
+          </a:xfrm>
+          <a:prstGeom prst="rect">
+            <a:avLst/>
+          </a:prstGeom>
+        </p:spPr>
+      </p:pic>
     </p:spTree>
   </p:cSld>
   <p:clrMapOvr>
@@ -9784,7 +10346,6 @@
               <a:rPr lang="fr-FR" sz="2000" dirty="0" smtClean="0"/>
               <a:t>Toutefois, l’application aurait pu avoir des fonctionnalités supplémentaire, notamment sur la personnalisation du design par le médecin (changement de couleur, fond personnalisé, ajout d’une signature pour le doc PDF, …) ainsi que des interfaces graphiques un peu plus poussé.</a:t>
             </a:r>
-            <a:endParaRPr lang="fr-FR" sz="2000" dirty="0" smtClean="0"/>
           </a:p>
           <a:p>
             <a:pPr>
@@ -9858,6 +10419,36 @@
           </a:p>
         </p:txBody>
       </p:sp>
+      <p:pic>
+        <p:nvPicPr>
+          <p:cNvPr id="5" name="Image 4"/>
+          <p:cNvPicPr>
+            <a:picLocks noChangeAspect="1"/>
+          </p:cNvPicPr>
+          <p:nvPr/>
+        </p:nvPicPr>
+        <p:blipFill>
+          <a:blip r:embed="rId3" cstate="print">
+            <a:extLst>
+              <a:ext uri="{28A0092B-C50C-407E-A947-70E740481C1C}">
+                <a14:useLocalDpi xmlns:a14="http://schemas.microsoft.com/office/drawing/2010/main" val="0"/>
+              </a:ext>
+            </a:extLst>
+          </a:blip>
+          <a:stretch>
+            <a:fillRect/>
+          </a:stretch>
+        </p:blipFill>
+        <p:spPr>
+          <a:xfrm>
+            <a:off x="7956376" y="6070981"/>
+            <a:ext cx="943868" cy="608947"/>
+          </a:xfrm>
+          <a:prstGeom prst="rect">
+            <a:avLst/>
+          </a:prstGeom>
+        </p:spPr>
+      </p:pic>
     </p:spTree>
   </p:cSld>
   <p:clrMapOvr>
@@ -9912,7 +10503,6 @@
               <a:rPr lang="fr-FR" sz="9600" b="1" dirty="0" smtClean="0"/>
               <a:t>DES QUESTIONS ?</a:t>
             </a:r>
-            <a:endParaRPr lang="fr-FR" sz="9600" b="1" dirty="0" smtClean="0"/>
           </a:p>
         </p:txBody>
       </p:sp>
@@ -9942,6 +10532,36 @@
           </a:p>
         </p:txBody>
       </p:sp>
+      <p:pic>
+        <p:nvPicPr>
+          <p:cNvPr id="4" name="Image 3"/>
+          <p:cNvPicPr>
+            <a:picLocks noChangeAspect="1"/>
+          </p:cNvPicPr>
+          <p:nvPr/>
+        </p:nvPicPr>
+        <p:blipFill>
+          <a:blip r:embed="rId3" cstate="print">
+            <a:extLst>
+              <a:ext uri="{28A0092B-C50C-407E-A947-70E740481C1C}">
+                <a14:useLocalDpi xmlns:a14="http://schemas.microsoft.com/office/drawing/2010/main" val="0"/>
+              </a:ext>
+            </a:extLst>
+          </a:blip>
+          <a:stretch>
+            <a:fillRect/>
+          </a:stretch>
+        </p:blipFill>
+        <p:spPr>
+          <a:xfrm>
+            <a:off x="7956376" y="6070981"/>
+            <a:ext cx="943868" cy="608947"/>
+          </a:xfrm>
+          <a:prstGeom prst="rect">
+            <a:avLst/>
+          </a:prstGeom>
+        </p:spPr>
+      </p:pic>
     </p:spTree>
   </p:cSld>
   <p:clrMapOvr>
@@ -10085,6 +10705,36 @@
           </a:p>
         </p:txBody>
       </p:sp>
+      <p:pic>
+        <p:nvPicPr>
+          <p:cNvPr id="6" name="Image 5"/>
+          <p:cNvPicPr>
+            <a:picLocks noChangeAspect="1"/>
+          </p:cNvPicPr>
+          <p:nvPr/>
+        </p:nvPicPr>
+        <p:blipFill>
+          <a:blip r:embed="rId2" cstate="print">
+            <a:extLst>
+              <a:ext uri="{28A0092B-C50C-407E-A947-70E740481C1C}">
+                <a14:useLocalDpi xmlns:a14="http://schemas.microsoft.com/office/drawing/2010/main" val="0"/>
+              </a:ext>
+            </a:extLst>
+          </a:blip>
+          <a:stretch>
+            <a:fillRect/>
+          </a:stretch>
+        </p:blipFill>
+        <p:spPr>
+          <a:xfrm>
+            <a:off x="7956376" y="6093296"/>
+            <a:ext cx="943868" cy="608947"/>
+          </a:xfrm>
+          <a:prstGeom prst="rect">
+            <a:avLst/>
+          </a:prstGeom>
+        </p:spPr>
+      </p:pic>
     </p:spTree>
   </p:cSld>
   <p:clrMapOvr>
@@ -10148,15 +10798,7 @@
             </a:pPr>
             <a:r>
               <a:rPr lang="fr-FR" sz="1600" dirty="0" smtClean="0"/>
-              <a:t>Exportation </a:t>
-            </a:r>
-            <a:r>
-              <a:rPr lang="fr-FR" sz="1600" dirty="0" smtClean="0"/>
-              <a:t>du certificat au format PDF</a:t>
-            </a:r>
-            <a:r>
-              <a:rPr lang="fr-FR" sz="1600" dirty="0" smtClean="0"/>
-              <a:t>.</a:t>
+              <a:t>Exportation du certificat au format PDF.</a:t>
             </a:r>
           </a:p>
           <a:p>
@@ -10168,7 +10810,6 @@
               <a:rPr lang="fr-FR" sz="1600" dirty="0" smtClean="0"/>
               <a:t>Notification par email en temps réel.</a:t>
             </a:r>
-            <a:endParaRPr lang="fr-FR" sz="1600" dirty="0" smtClean="0"/>
           </a:p>
           <a:p>
             <a:pPr lvl="1">
@@ -10186,13 +10827,8 @@
             </a:pPr>
             <a:r>
               <a:rPr lang="fr-FR" sz="2000" dirty="0" smtClean="0"/>
-              <a:t>Gestion des </a:t>
-            </a:r>
-            <a:r>
-              <a:rPr lang="fr-FR" sz="2000" dirty="0" smtClean="0"/>
-              <a:t>étudiants:</a:t>
-            </a:r>
-            <a:endParaRPr lang="fr-FR" sz="2000" dirty="0" smtClean="0"/>
+              <a:t>Gestion des étudiants:</a:t>
+            </a:r>
           </a:p>
           <a:p>
             <a:pPr lvl="1">
@@ -10238,13 +10874,8 @@
             </a:pPr>
             <a:r>
               <a:rPr lang="fr-FR" sz="2000" dirty="0" smtClean="0"/>
-              <a:t>Gestion du profil </a:t>
-            </a:r>
-            <a:r>
-              <a:rPr lang="fr-FR" sz="2000" dirty="0" smtClean="0"/>
-              <a:t>médecin:</a:t>
-            </a:r>
-            <a:endParaRPr lang="fr-FR" sz="2000" dirty="0" smtClean="0"/>
+              <a:t>Gestion du profil médecin:</a:t>
+            </a:r>
           </a:p>
           <a:p>
             <a:pPr lvl="1">
@@ -10361,6 +10992,36 @@
           </a:p>
         </p:txBody>
       </p:sp>
+      <p:pic>
+        <p:nvPicPr>
+          <p:cNvPr id="6" name="Image 5"/>
+          <p:cNvPicPr>
+            <a:picLocks noChangeAspect="1"/>
+          </p:cNvPicPr>
+          <p:nvPr/>
+        </p:nvPicPr>
+        <p:blipFill>
+          <a:blip r:embed="rId2" cstate="print">
+            <a:extLst>
+              <a:ext uri="{28A0092B-C50C-407E-A947-70E740481C1C}">
+                <a14:useLocalDpi xmlns:a14="http://schemas.microsoft.com/office/drawing/2010/main" val="0"/>
+              </a:ext>
+            </a:extLst>
+          </a:blip>
+          <a:stretch>
+            <a:fillRect/>
+          </a:stretch>
+        </p:blipFill>
+        <p:spPr>
+          <a:xfrm>
+            <a:off x="7956376" y="6070981"/>
+            <a:ext cx="943868" cy="608947"/>
+          </a:xfrm>
+          <a:prstGeom prst="rect">
+            <a:avLst/>
+          </a:prstGeom>
+        </p:spPr>
+      </p:pic>
     </p:spTree>
   </p:cSld>
   <p:clrMapOvr>
@@ -10545,6 +11206,36 @@
           </a:p>
         </p:txBody>
       </p:sp>
+      <p:pic>
+        <p:nvPicPr>
+          <p:cNvPr id="6" name="Image 5"/>
+          <p:cNvPicPr>
+            <a:picLocks noChangeAspect="1"/>
+          </p:cNvPicPr>
+          <p:nvPr/>
+        </p:nvPicPr>
+        <p:blipFill>
+          <a:blip r:embed="rId2" cstate="print">
+            <a:extLst>
+              <a:ext uri="{28A0092B-C50C-407E-A947-70E740481C1C}">
+                <a14:useLocalDpi xmlns:a14="http://schemas.microsoft.com/office/drawing/2010/main" val="0"/>
+              </a:ext>
+            </a:extLst>
+          </a:blip>
+          <a:stretch>
+            <a:fillRect/>
+          </a:stretch>
+        </p:blipFill>
+        <p:spPr>
+          <a:xfrm>
+            <a:off x="7956376" y="6070981"/>
+            <a:ext cx="943868" cy="608947"/>
+          </a:xfrm>
+          <a:prstGeom prst="rect">
+            <a:avLst/>
+          </a:prstGeom>
+        </p:spPr>
+      </p:pic>
     </p:spTree>
   </p:cSld>
   <p:clrMapOvr>
@@ -10751,6 +11442,36 @@
           </a:p>
         </p:txBody>
       </p:sp>
+      <p:pic>
+        <p:nvPicPr>
+          <p:cNvPr id="6" name="Image 5"/>
+          <p:cNvPicPr>
+            <a:picLocks noChangeAspect="1"/>
+          </p:cNvPicPr>
+          <p:nvPr/>
+        </p:nvPicPr>
+        <p:blipFill>
+          <a:blip r:embed="rId3" cstate="print">
+            <a:extLst>
+              <a:ext uri="{28A0092B-C50C-407E-A947-70E740481C1C}">
+                <a14:useLocalDpi xmlns:a14="http://schemas.microsoft.com/office/drawing/2010/main" val="0"/>
+              </a:ext>
+            </a:extLst>
+          </a:blip>
+          <a:stretch>
+            <a:fillRect/>
+          </a:stretch>
+        </p:blipFill>
+        <p:spPr>
+          <a:xfrm>
+            <a:off x="7956376" y="6070981"/>
+            <a:ext cx="943868" cy="608947"/>
+          </a:xfrm>
+          <a:prstGeom prst="rect">
+            <a:avLst/>
+          </a:prstGeom>
+        </p:spPr>
+      </p:pic>
     </p:spTree>
   </p:cSld>
   <p:clrMapOvr>
@@ -10921,13 +11642,8 @@
             </a:pPr>
             <a:r>
               <a:rPr lang="fr-FR" sz="2000" b="1" dirty="0" smtClean="0"/>
-              <a:t>Service Web de type SOAP avec </a:t>
-            </a:r>
-            <a:r>
-              <a:rPr lang="fr-FR" sz="2000" b="1" dirty="0" smtClean="0"/>
-              <a:t>WCF</a:t>
-            </a:r>
-            <a:endParaRPr lang="fr-FR" sz="2000" b="1" dirty="0" smtClean="0"/>
+              <a:t>Service Web de type SOAP avec WCF</a:t>
+            </a:r>
           </a:p>
           <a:p>
             <a:pPr>
@@ -11126,6 +11842,36 @@
           <a:xfrm>
             <a:off x="2555776" y="3933056"/>
             <a:ext cx="360040" cy="360040"/>
+          </a:xfrm>
+          <a:prstGeom prst="rect">
+            <a:avLst/>
+          </a:prstGeom>
+        </p:spPr>
+      </p:pic>
+      <p:pic>
+        <p:nvPicPr>
+          <p:cNvPr id="13" name="Image 12"/>
+          <p:cNvPicPr>
+            <a:picLocks noChangeAspect="1"/>
+          </p:cNvPicPr>
+          <p:nvPr/>
+        </p:nvPicPr>
+        <p:blipFill>
+          <a:blip r:embed="rId8" cstate="print">
+            <a:extLst>
+              <a:ext uri="{28A0092B-C50C-407E-A947-70E740481C1C}">
+                <a14:useLocalDpi xmlns:a14="http://schemas.microsoft.com/office/drawing/2010/main" val="0"/>
+              </a:ext>
+            </a:extLst>
+          </a:blip>
+          <a:stretch>
+            <a:fillRect/>
+          </a:stretch>
+        </p:blipFill>
+        <p:spPr>
+          <a:xfrm>
+            <a:off x="7956376" y="6070981"/>
+            <a:ext cx="943868" cy="608947"/>
           </a:xfrm>
           <a:prstGeom prst="rect">
             <a:avLst/>
@@ -11219,11 +11965,7 @@
             </a:pPr>
             <a:r>
               <a:rPr lang="fr-FR" sz="2000" b="1" dirty="0" smtClean="0"/>
-              <a:t>Pourquoi </a:t>
-            </a:r>
-            <a:r>
-              <a:rPr lang="fr-FR" sz="2000" b="1" dirty="0" smtClean="0"/>
-              <a:t>le protocole SOAP avec WCF ?</a:t>
+              <a:t>Pourquoi le protocole SOAP avec WCF ?</a:t>
             </a:r>
           </a:p>
           <a:p>
@@ -11269,15 +12011,7 @@
             </a:pPr>
             <a:r>
               <a:rPr lang="fr-FR" sz="1600" dirty="0" smtClean="0"/>
-              <a:t>Meilleure </a:t>
-            </a:r>
-            <a:r>
-              <a:rPr lang="fr-FR" sz="1600" dirty="0" smtClean="0"/>
-              <a:t>lisibilité </a:t>
-            </a:r>
-            <a:r>
-              <a:rPr lang="fr-FR" sz="1600" dirty="0" smtClean="0"/>
-              <a:t>dans le code.</a:t>
+              <a:t>Meilleure lisibilité dans le code.</a:t>
             </a:r>
           </a:p>
         </p:txBody>
@@ -11346,6 +12080,36 @@
           </a:p>
         </p:txBody>
       </p:sp>
+      <p:pic>
+        <p:nvPicPr>
+          <p:cNvPr id="6" name="Image 5"/>
+          <p:cNvPicPr>
+            <a:picLocks noChangeAspect="1"/>
+          </p:cNvPicPr>
+          <p:nvPr/>
+        </p:nvPicPr>
+        <p:blipFill>
+          <a:blip r:embed="rId3" cstate="print">
+            <a:extLst>
+              <a:ext uri="{28A0092B-C50C-407E-A947-70E740481C1C}">
+                <a14:useLocalDpi xmlns:a14="http://schemas.microsoft.com/office/drawing/2010/main" val="0"/>
+              </a:ext>
+            </a:extLst>
+          </a:blip>
+          <a:stretch>
+            <a:fillRect/>
+          </a:stretch>
+        </p:blipFill>
+        <p:spPr>
+          <a:xfrm>
+            <a:off x="7956376" y="6070981"/>
+            <a:ext cx="943868" cy="608947"/>
+          </a:xfrm>
+          <a:prstGeom prst="rect">
+            <a:avLst/>
+          </a:prstGeom>
+        </p:spPr>
+      </p:pic>
     </p:spTree>
   </p:cSld>
   <p:clrMapOvr>
@@ -11420,11 +12184,7 @@
             </a:pPr>
             <a:r>
               <a:rPr lang="fr-FR" sz="2000" dirty="0" smtClean="0"/>
-              <a:t>Il propose ainsi </a:t>
-            </a:r>
-            <a:r>
-              <a:rPr lang="fr-FR" sz="2000" dirty="0" smtClean="0"/>
-              <a:t>la création d'un schéma conceptuel composé d'entités qui permettent la manipulation d'une source de données, </a:t>
+              <a:t>Il propose ainsi la création d'un schéma conceptuel composé d'entités qui permettent la manipulation d'une source de données, </a:t>
             </a:r>
             <a:r>
               <a:rPr lang="fr-FR" sz="2000" b="1" dirty="0" smtClean="0"/>
@@ -11526,6 +12286,36 @@
           </a:p>
         </p:txBody>
       </p:sp>
+      <p:pic>
+        <p:nvPicPr>
+          <p:cNvPr id="6" name="Image 5"/>
+          <p:cNvPicPr>
+            <a:picLocks noChangeAspect="1"/>
+          </p:cNvPicPr>
+          <p:nvPr/>
+        </p:nvPicPr>
+        <p:blipFill>
+          <a:blip r:embed="rId3" cstate="print">
+            <a:extLst>
+              <a:ext uri="{28A0092B-C50C-407E-A947-70E740481C1C}">
+                <a14:useLocalDpi xmlns:a14="http://schemas.microsoft.com/office/drawing/2010/main" val="0"/>
+              </a:ext>
+            </a:extLst>
+          </a:blip>
+          <a:stretch>
+            <a:fillRect/>
+          </a:stretch>
+        </p:blipFill>
+        <p:spPr>
+          <a:xfrm>
+            <a:off x="7956376" y="6070981"/>
+            <a:ext cx="943868" cy="608947"/>
+          </a:xfrm>
+          <a:prstGeom prst="rect">
+            <a:avLst/>
+          </a:prstGeom>
+        </p:spPr>
+      </p:pic>
     </p:spTree>
   </p:cSld>
   <p:clrMapOvr>

</xml_diff>